<commit_message>
Final draft of storage slides
</commit_message>
<xml_diff>
--- a/Workshop/Content/3. Storage/Azure Storage and Cognitive Services.pptx
+++ b/Workshop/Content/3. Storage/Azure Storage and Cognitive Services.pptx
@@ -221,7 +221,7 @@
           <a:p>
             <a:fld id="{49B60EF2-7028-489F-85D8-FE86CD7CF2A0}" type="datetimeFigureOut">
               <a:rPr lang="en-US" smtClean="0"/>
-              <a:t>6/21/2016</a:t>
+              <a:t>6/22/2016</a:t>
             </a:fld>
             <a:endParaRPr lang="en-US"/>
           </a:p>
@@ -572,6 +572,727 @@
 </p:notes>
 </file>
 
+<file path=ppt/notesSlides/notesSlide10.xml><?xml version="1.0" encoding="utf-8"?>
+<p:notes xmlns:a="http://schemas.openxmlformats.org/drawingml/2006/main" xmlns:r="http://schemas.openxmlformats.org/officeDocument/2006/relationships" xmlns:p="http://schemas.openxmlformats.org/presentationml/2006/main">
+  <p:cSld>
+    <p:spTree>
+      <p:nvGrpSpPr>
+        <p:cNvPr id="1" name=""/>
+        <p:cNvGrpSpPr/>
+        <p:nvPr/>
+      </p:nvGrpSpPr>
+      <p:grpSpPr>
+        <a:xfrm>
+          <a:off x="0" y="0"/>
+          <a:ext cx="0" cy="0"/>
+          <a:chOff x="0" y="0"/>
+          <a:chExt cx="0" cy="0"/>
+        </a:xfrm>
+      </p:grpSpPr>
+      <p:sp>
+        <p:nvSpPr>
+          <p:cNvPr id="2" name="Slide Image Placeholder 1"/>
+          <p:cNvSpPr>
+            <a:spLocks noGrp="1" noRot="1" noChangeAspect="1"/>
+          </p:cNvSpPr>
+          <p:nvPr>
+            <p:ph type="sldImg"/>
+          </p:nvPr>
+        </p:nvSpPr>
+        <p:spPr/>
+      </p:sp>
+      <p:sp>
+        <p:nvSpPr>
+          <p:cNvPr id="3" name="Notes Placeholder 2"/>
+          <p:cNvSpPr>
+            <a:spLocks noGrp="1"/>
+          </p:cNvSpPr>
+          <p:nvPr>
+            <p:ph type="body" idx="1"/>
+          </p:nvPr>
+        </p:nvSpPr>
+        <p:spPr/>
+        <p:txBody>
+          <a:bodyPr/>
+          <a:lstStyle/>
+          <a:p>
+            <a:pPr marL="0" marR="0" indent="0" algn="l" defTabSz="914400" rtl="0" eaLnBrk="1" fontAlgn="auto" latinLnBrk="0" hangingPunct="1">
+              <a:lnSpc>
+                <a:spcPct val="100000"/>
+              </a:lnSpc>
+              <a:spcBef>
+                <a:spcPts val="0"/>
+              </a:spcBef>
+              <a:spcAft>
+                <a:spcPts val="0"/>
+              </a:spcAft>
+              <a:buClrTx/>
+              <a:buSzTx/>
+              <a:buFontTx/>
+              <a:buNone/>
+              <a:tabLst/>
+              <a:defRPr/>
+            </a:pPr>
+            <a:r>
+              <a:rPr lang="en-US" dirty="0" smtClean="0"/>
+              <a:t>The Microsoft Azure Storage Explorer provides an easy-to-use</a:t>
+            </a:r>
+            <a:r>
+              <a:rPr lang="en-US" baseline="0" dirty="0" smtClean="0"/>
+              <a:t> GUI interface for creating containers, uploading and downloading blobs, generating SAS tokens, and more. But if you want to use a scripting language such as Bash or PowerShell to script storage operations, the Azure CLI is the way to go.</a:t>
+            </a:r>
+            <a:endParaRPr lang="en-US" dirty="0" smtClean="0"/>
+          </a:p>
+        </p:txBody>
+      </p:sp>
+      <p:sp>
+        <p:nvSpPr>
+          <p:cNvPr id="4" name="Slide Number Placeholder 3"/>
+          <p:cNvSpPr>
+            <a:spLocks noGrp="1"/>
+          </p:cNvSpPr>
+          <p:nvPr>
+            <p:ph type="sldNum" sz="quarter" idx="10"/>
+          </p:nvPr>
+        </p:nvSpPr>
+        <p:spPr/>
+        <p:txBody>
+          <a:bodyPr/>
+          <a:lstStyle/>
+          <a:p>
+            <a:fld id="{01283FAC-A721-45A3-BBDE-EAF2B09B7CD9}" type="slidenum">
+              <a:rPr lang="en-US" smtClean="0"/>
+              <a:t>10</a:t>
+            </a:fld>
+            <a:endParaRPr lang="en-US"/>
+          </a:p>
+        </p:txBody>
+      </p:sp>
+    </p:spTree>
+    <p:extLst>
+      <p:ext uri="{BB962C8B-B14F-4D97-AF65-F5344CB8AC3E}">
+        <p14:creationId xmlns:p14="http://schemas.microsoft.com/office/powerpoint/2010/main" val="2058981737"/>
+      </p:ext>
+    </p:extLst>
+  </p:cSld>
+  <p:clrMapOvr>
+    <a:masterClrMapping/>
+  </p:clrMapOvr>
+</p:notes>
+</file>
+
+<file path=ppt/notesSlides/notesSlide11.xml><?xml version="1.0" encoding="utf-8"?>
+<p:notes xmlns:a="http://schemas.openxmlformats.org/drawingml/2006/main" xmlns:r="http://schemas.openxmlformats.org/officeDocument/2006/relationships" xmlns:p="http://schemas.openxmlformats.org/presentationml/2006/main">
+  <p:cSld>
+    <p:spTree>
+      <p:nvGrpSpPr>
+        <p:cNvPr id="1" name=""/>
+        <p:cNvGrpSpPr/>
+        <p:nvPr/>
+      </p:nvGrpSpPr>
+      <p:grpSpPr>
+        <a:xfrm>
+          <a:off x="0" y="0"/>
+          <a:ext cx="0" cy="0"/>
+          <a:chOff x="0" y="0"/>
+          <a:chExt cx="0" cy="0"/>
+        </a:xfrm>
+      </p:grpSpPr>
+      <p:sp>
+        <p:nvSpPr>
+          <p:cNvPr id="2" name="Slide Image Placeholder 1"/>
+          <p:cNvSpPr>
+            <a:spLocks noGrp="1" noRot="1" noChangeAspect="1"/>
+          </p:cNvSpPr>
+          <p:nvPr>
+            <p:ph type="sldImg"/>
+          </p:nvPr>
+        </p:nvSpPr>
+        <p:spPr/>
+      </p:sp>
+      <p:sp>
+        <p:nvSpPr>
+          <p:cNvPr id="3" name="Notes Placeholder 2"/>
+          <p:cNvSpPr>
+            <a:spLocks noGrp="1"/>
+          </p:cNvSpPr>
+          <p:nvPr>
+            <p:ph type="body" idx="1"/>
+          </p:nvPr>
+        </p:nvSpPr>
+        <p:spPr/>
+        <p:txBody>
+          <a:bodyPr/>
+          <a:lstStyle/>
+          <a:p>
+            <a:r>
+              <a:rPr lang="en-US" dirty="0" smtClean="0"/>
+              <a:t>Azure provides a very rich REST-based API for blob</a:t>
+            </a:r>
+            <a:r>
+              <a:rPr lang="en-US" baseline="0" dirty="0" smtClean="0"/>
+              <a:t> storage. Microsoft also provides free libraries/SDKs for popular platforms and languages that wrap the REST API and simplify the code that you write.</a:t>
+            </a:r>
+            <a:endParaRPr lang="en-US" dirty="0"/>
+          </a:p>
+        </p:txBody>
+      </p:sp>
+      <p:sp>
+        <p:nvSpPr>
+          <p:cNvPr id="4" name="Slide Number Placeholder 3"/>
+          <p:cNvSpPr>
+            <a:spLocks noGrp="1"/>
+          </p:cNvSpPr>
+          <p:nvPr>
+            <p:ph type="sldNum" sz="quarter" idx="10"/>
+          </p:nvPr>
+        </p:nvSpPr>
+        <p:spPr/>
+        <p:txBody>
+          <a:bodyPr/>
+          <a:lstStyle/>
+          <a:p>
+            <a:fld id="{01283FAC-A721-45A3-BBDE-EAF2B09B7CD9}" type="slidenum">
+              <a:rPr lang="en-US" smtClean="0"/>
+              <a:t>11</a:t>
+            </a:fld>
+            <a:endParaRPr lang="en-US"/>
+          </a:p>
+        </p:txBody>
+      </p:sp>
+    </p:spTree>
+    <p:extLst>
+      <p:ext uri="{BB962C8B-B14F-4D97-AF65-F5344CB8AC3E}">
+        <p14:creationId xmlns:p14="http://schemas.microsoft.com/office/powerpoint/2010/main" val="242568734"/>
+      </p:ext>
+    </p:extLst>
+  </p:cSld>
+  <p:clrMapOvr>
+    <a:masterClrMapping/>
+  </p:clrMapOvr>
+</p:notes>
+</file>
+
+<file path=ppt/notesSlides/notesSlide12.xml><?xml version="1.0" encoding="utf-8"?>
+<p:notes xmlns:a="http://schemas.openxmlformats.org/drawingml/2006/main" xmlns:r="http://schemas.openxmlformats.org/officeDocument/2006/relationships" xmlns:p="http://schemas.openxmlformats.org/presentationml/2006/main">
+  <p:cSld>
+    <p:spTree>
+      <p:nvGrpSpPr>
+        <p:cNvPr id="1" name=""/>
+        <p:cNvGrpSpPr/>
+        <p:nvPr/>
+      </p:nvGrpSpPr>
+      <p:grpSpPr>
+        <a:xfrm>
+          <a:off x="0" y="0"/>
+          <a:ext cx="0" cy="0"/>
+          <a:chOff x="0" y="0"/>
+          <a:chExt cx="0" cy="0"/>
+        </a:xfrm>
+      </p:grpSpPr>
+      <p:sp>
+        <p:nvSpPr>
+          <p:cNvPr id="2" name="Slide Image Placeholder 1"/>
+          <p:cNvSpPr>
+            <a:spLocks noGrp="1" noRot="1" noChangeAspect="1"/>
+          </p:cNvSpPr>
+          <p:nvPr>
+            <p:ph type="sldImg"/>
+          </p:nvPr>
+        </p:nvSpPr>
+        <p:spPr/>
+      </p:sp>
+      <p:sp>
+        <p:nvSpPr>
+          <p:cNvPr id="3" name="Notes Placeholder 2"/>
+          <p:cNvSpPr>
+            <a:spLocks noGrp="1"/>
+          </p:cNvSpPr>
+          <p:nvPr>
+            <p:ph type="body" idx="1"/>
+          </p:nvPr>
+        </p:nvSpPr>
+        <p:spPr/>
+        <p:txBody>
+          <a:bodyPr/>
+          <a:lstStyle/>
+          <a:p>
+            <a:r>
+              <a:rPr lang="en-US" dirty="0" smtClean="0"/>
+              <a:t>Cognitive</a:t>
+            </a:r>
+            <a:r>
+              <a:rPr lang="en-US" baseline="0" dirty="0" smtClean="0"/>
+              <a:t> Services includes 21 APIs that fall into five categories: vision, speech, language, knowledge, and search.</a:t>
+            </a:r>
+            <a:endParaRPr lang="en-US" dirty="0"/>
+          </a:p>
+        </p:txBody>
+      </p:sp>
+      <p:sp>
+        <p:nvSpPr>
+          <p:cNvPr id="4" name="Slide Number Placeholder 3"/>
+          <p:cNvSpPr>
+            <a:spLocks noGrp="1"/>
+          </p:cNvSpPr>
+          <p:nvPr>
+            <p:ph type="sldNum" sz="quarter" idx="10"/>
+          </p:nvPr>
+        </p:nvSpPr>
+        <p:spPr/>
+        <p:txBody>
+          <a:bodyPr/>
+          <a:lstStyle/>
+          <a:p>
+            <a:fld id="{01283FAC-A721-45A3-BBDE-EAF2B09B7CD9}" type="slidenum">
+              <a:rPr lang="en-US" smtClean="0"/>
+              <a:t>18</a:t>
+            </a:fld>
+            <a:endParaRPr lang="en-US"/>
+          </a:p>
+        </p:txBody>
+      </p:sp>
+    </p:spTree>
+    <p:extLst>
+      <p:ext uri="{BB962C8B-B14F-4D97-AF65-F5344CB8AC3E}">
+        <p14:creationId xmlns:p14="http://schemas.microsoft.com/office/powerpoint/2010/main" val="1813930632"/>
+      </p:ext>
+    </p:extLst>
+  </p:cSld>
+  <p:clrMapOvr>
+    <a:masterClrMapping/>
+  </p:clrMapOvr>
+</p:notes>
+</file>
+
+<file path=ppt/notesSlides/notesSlide13.xml><?xml version="1.0" encoding="utf-8"?>
+<p:notes xmlns:a="http://schemas.openxmlformats.org/drawingml/2006/main" xmlns:r="http://schemas.openxmlformats.org/officeDocument/2006/relationships" xmlns:p="http://schemas.openxmlformats.org/presentationml/2006/main">
+  <p:cSld>
+    <p:spTree>
+      <p:nvGrpSpPr>
+        <p:cNvPr id="1" name=""/>
+        <p:cNvGrpSpPr/>
+        <p:nvPr/>
+      </p:nvGrpSpPr>
+      <p:grpSpPr>
+        <a:xfrm>
+          <a:off x="0" y="0"/>
+          <a:ext cx="0" cy="0"/>
+          <a:chOff x="0" y="0"/>
+          <a:chExt cx="0" cy="0"/>
+        </a:xfrm>
+      </p:grpSpPr>
+      <p:sp>
+        <p:nvSpPr>
+          <p:cNvPr id="2" name="Slide Image Placeholder 1"/>
+          <p:cNvSpPr>
+            <a:spLocks noGrp="1" noRot="1" noChangeAspect="1"/>
+          </p:cNvSpPr>
+          <p:nvPr>
+            <p:ph type="sldImg"/>
+          </p:nvPr>
+        </p:nvSpPr>
+        <p:spPr/>
+      </p:sp>
+      <p:sp>
+        <p:nvSpPr>
+          <p:cNvPr id="3" name="Notes Placeholder 2"/>
+          <p:cNvSpPr>
+            <a:spLocks noGrp="1"/>
+          </p:cNvSpPr>
+          <p:nvPr>
+            <p:ph type="body" idx="1"/>
+          </p:nvPr>
+        </p:nvSpPr>
+        <p:spPr/>
+        <p:txBody>
+          <a:bodyPr/>
+          <a:lstStyle/>
+          <a:p>
+            <a:r>
+              <a:rPr lang="en-US" sz="1200" b="0" i="0" kern="1200" dirty="0" smtClean="0">
+                <a:solidFill>
+                  <a:schemeClr val="tx1"/>
+                </a:solidFill>
+                <a:effectLst/>
+                <a:latin typeface="+mn-lt"/>
+                <a:ea typeface="+mn-ea"/>
+                <a:cs typeface="+mn-cs"/>
+              </a:rPr>
+              <a:t> </a:t>
+            </a:r>
+            <a:r>
+              <a:rPr lang="en-US" sz="1200" b="0" i="0" u="none" strike="noStrike" kern="1200" dirty="0" smtClean="0">
+                <a:solidFill>
+                  <a:schemeClr val="tx1"/>
+                </a:solidFill>
+                <a:effectLst/>
+                <a:latin typeface="+mn-lt"/>
+                <a:ea typeface="+mn-ea"/>
+                <a:cs typeface="+mn-cs"/>
+              </a:rPr>
+              <a:t>Microsoft Cognitive Services</a:t>
+            </a:r>
+            <a:r>
+              <a:rPr lang="en-US" sz="1200" b="0" i="0" u="none" strike="noStrike" kern="1200" baseline="0" dirty="0" smtClean="0">
+                <a:solidFill>
+                  <a:schemeClr val="tx1"/>
+                </a:solidFill>
+                <a:effectLst/>
+                <a:latin typeface="+mn-lt"/>
+                <a:ea typeface="+mn-ea"/>
+                <a:cs typeface="+mn-cs"/>
+              </a:rPr>
+              <a:t> is </a:t>
+            </a:r>
+            <a:r>
+              <a:rPr lang="en-US" sz="1200" b="0" i="0" kern="1200" dirty="0" smtClean="0">
+                <a:solidFill>
+                  <a:schemeClr val="tx1"/>
+                </a:solidFill>
+                <a:effectLst/>
+                <a:latin typeface="+mn-lt"/>
+                <a:ea typeface="+mn-ea"/>
+                <a:cs typeface="+mn-cs"/>
+              </a:rPr>
+              <a:t>a set of intelligent APIs for building equally intelligent applications. It currently offers 21 different API for analyzing images, videos, text, and much more. For more information, visit https://www.microsoft.com/cognitive-services.</a:t>
+            </a:r>
+            <a:endParaRPr lang="en-US" dirty="0"/>
+          </a:p>
+        </p:txBody>
+      </p:sp>
+      <p:sp>
+        <p:nvSpPr>
+          <p:cNvPr id="4" name="Slide Number Placeholder 3"/>
+          <p:cNvSpPr>
+            <a:spLocks noGrp="1"/>
+          </p:cNvSpPr>
+          <p:nvPr>
+            <p:ph type="sldNum" sz="quarter" idx="10"/>
+          </p:nvPr>
+        </p:nvSpPr>
+        <p:spPr/>
+        <p:txBody>
+          <a:bodyPr/>
+          <a:lstStyle/>
+          <a:p>
+            <a:fld id="{01283FAC-A721-45A3-BBDE-EAF2B09B7CD9}" type="slidenum">
+              <a:rPr lang="en-US" smtClean="0"/>
+              <a:t>19</a:t>
+            </a:fld>
+            <a:endParaRPr lang="en-US"/>
+          </a:p>
+        </p:txBody>
+      </p:sp>
+    </p:spTree>
+    <p:extLst>
+      <p:ext uri="{BB962C8B-B14F-4D97-AF65-F5344CB8AC3E}">
+        <p14:creationId xmlns:p14="http://schemas.microsoft.com/office/powerpoint/2010/main" val="2599400582"/>
+      </p:ext>
+    </p:extLst>
+  </p:cSld>
+  <p:clrMapOvr>
+    <a:masterClrMapping/>
+  </p:clrMapOvr>
+</p:notes>
+</file>
+
+<file path=ppt/notesSlides/notesSlide14.xml><?xml version="1.0" encoding="utf-8"?>
+<p:notes xmlns:a="http://schemas.openxmlformats.org/drawingml/2006/main" xmlns:r="http://schemas.openxmlformats.org/officeDocument/2006/relationships" xmlns:p="http://schemas.openxmlformats.org/presentationml/2006/main">
+  <p:cSld>
+    <p:spTree>
+      <p:nvGrpSpPr>
+        <p:cNvPr id="1" name=""/>
+        <p:cNvGrpSpPr/>
+        <p:nvPr/>
+      </p:nvGrpSpPr>
+      <p:grpSpPr>
+        <a:xfrm>
+          <a:off x="0" y="0"/>
+          <a:ext cx="0" cy="0"/>
+          <a:chOff x="0" y="0"/>
+          <a:chExt cx="0" cy="0"/>
+        </a:xfrm>
+      </p:grpSpPr>
+      <p:sp>
+        <p:nvSpPr>
+          <p:cNvPr id="2" name="Slide Image Placeholder 1"/>
+          <p:cNvSpPr>
+            <a:spLocks noGrp="1" noRot="1" noChangeAspect="1"/>
+          </p:cNvSpPr>
+          <p:nvPr>
+            <p:ph type="sldImg"/>
+          </p:nvPr>
+        </p:nvSpPr>
+        <p:spPr/>
+      </p:sp>
+      <p:sp>
+        <p:nvSpPr>
+          <p:cNvPr id="3" name="Notes Placeholder 2"/>
+          <p:cNvSpPr>
+            <a:spLocks noGrp="1"/>
+          </p:cNvSpPr>
+          <p:nvPr>
+            <p:ph type="body" idx="1"/>
+          </p:nvPr>
+        </p:nvSpPr>
+        <p:spPr/>
+        <p:txBody>
+          <a:bodyPr/>
+          <a:lstStyle/>
+          <a:p>
+            <a:r>
+              <a:rPr lang="en-US" dirty="0" smtClean="0"/>
+              <a:t>The Computer Vision API, part of Cognitive</a:t>
+            </a:r>
+            <a:r>
+              <a:rPr lang="en-US" baseline="0" dirty="0" smtClean="0"/>
+              <a:t> Services, offers methods for captioning images, generating metadata keywords, recognizing celebrities, reading text, and generating "smart" thumbnails. For more information, visit https://www.microsoft.com/cognitive-services/en-us/computer-vision-api.</a:t>
+            </a:r>
+            <a:endParaRPr lang="en-US" dirty="0"/>
+          </a:p>
+        </p:txBody>
+      </p:sp>
+      <p:sp>
+        <p:nvSpPr>
+          <p:cNvPr id="4" name="Slide Number Placeholder 3"/>
+          <p:cNvSpPr>
+            <a:spLocks noGrp="1"/>
+          </p:cNvSpPr>
+          <p:nvPr>
+            <p:ph type="sldNum" sz="quarter" idx="10"/>
+          </p:nvPr>
+        </p:nvSpPr>
+        <p:spPr/>
+        <p:txBody>
+          <a:bodyPr/>
+          <a:lstStyle/>
+          <a:p>
+            <a:fld id="{01283FAC-A721-45A3-BBDE-EAF2B09B7CD9}" type="slidenum">
+              <a:rPr lang="en-US" smtClean="0"/>
+              <a:t>20</a:t>
+            </a:fld>
+            <a:endParaRPr lang="en-US"/>
+          </a:p>
+        </p:txBody>
+      </p:sp>
+    </p:spTree>
+    <p:extLst>
+      <p:ext uri="{BB962C8B-B14F-4D97-AF65-F5344CB8AC3E}">
+        <p14:creationId xmlns:p14="http://schemas.microsoft.com/office/powerpoint/2010/main" val="3186057134"/>
+      </p:ext>
+    </p:extLst>
+  </p:cSld>
+  <p:clrMapOvr>
+    <a:masterClrMapping/>
+  </p:clrMapOvr>
+</p:notes>
+</file>
+
+<file path=ppt/notesSlides/notesSlide15.xml><?xml version="1.0" encoding="utf-8"?>
+<p:notes xmlns:a="http://schemas.openxmlformats.org/drawingml/2006/main" xmlns:r="http://schemas.openxmlformats.org/officeDocument/2006/relationships" xmlns:p="http://schemas.openxmlformats.org/presentationml/2006/main">
+  <p:cSld>
+    <p:spTree>
+      <p:nvGrpSpPr>
+        <p:cNvPr id="1" name=""/>
+        <p:cNvGrpSpPr/>
+        <p:nvPr/>
+      </p:nvGrpSpPr>
+      <p:grpSpPr>
+        <a:xfrm>
+          <a:off x="0" y="0"/>
+          <a:ext cx="0" cy="0"/>
+          <a:chOff x="0" y="0"/>
+          <a:chExt cx="0" cy="0"/>
+        </a:xfrm>
+      </p:grpSpPr>
+      <p:sp>
+        <p:nvSpPr>
+          <p:cNvPr id="2" name="Slide Image Placeholder 1"/>
+          <p:cNvSpPr>
+            <a:spLocks noGrp="1" noRot="1" noChangeAspect="1"/>
+          </p:cNvSpPr>
+          <p:nvPr>
+            <p:ph type="sldImg"/>
+          </p:nvPr>
+        </p:nvSpPr>
+        <p:spPr/>
+      </p:sp>
+      <p:sp>
+        <p:nvSpPr>
+          <p:cNvPr id="3" name="Notes Placeholder 2"/>
+          <p:cNvSpPr>
+            <a:spLocks noGrp="1"/>
+          </p:cNvSpPr>
+          <p:nvPr>
+            <p:ph type="body" idx="1"/>
+          </p:nvPr>
+        </p:nvSpPr>
+        <p:spPr/>
+        <p:txBody>
+          <a:bodyPr/>
+          <a:lstStyle/>
+          <a:p>
+            <a:r>
+              <a:rPr lang="en-US" dirty="0" smtClean="0"/>
+              <a:t>Students will write</a:t>
+            </a:r>
+            <a:r>
+              <a:rPr lang="en-US" baseline="0" dirty="0" smtClean="0"/>
+              <a:t> code similar to this in the next lab to submit images uploaded to a Web site to the Computer Vision API in order to generate captions and search keywords. This example is written in C# for Microsoft .NET.</a:t>
+            </a:r>
+            <a:endParaRPr lang="en-US" dirty="0"/>
+          </a:p>
+        </p:txBody>
+      </p:sp>
+      <p:sp>
+        <p:nvSpPr>
+          <p:cNvPr id="4" name="Slide Number Placeholder 3"/>
+          <p:cNvSpPr>
+            <a:spLocks noGrp="1"/>
+          </p:cNvSpPr>
+          <p:nvPr>
+            <p:ph type="sldNum" sz="quarter" idx="10"/>
+          </p:nvPr>
+        </p:nvSpPr>
+        <p:spPr/>
+        <p:txBody>
+          <a:bodyPr/>
+          <a:lstStyle/>
+          <a:p>
+            <a:fld id="{01283FAC-A721-45A3-BBDE-EAF2B09B7CD9}" type="slidenum">
+              <a:rPr lang="en-US" smtClean="0"/>
+              <a:t>21</a:t>
+            </a:fld>
+            <a:endParaRPr lang="en-US"/>
+          </a:p>
+        </p:txBody>
+      </p:sp>
+    </p:spTree>
+    <p:extLst>
+      <p:ext uri="{BB962C8B-B14F-4D97-AF65-F5344CB8AC3E}">
+        <p14:creationId xmlns:p14="http://schemas.microsoft.com/office/powerpoint/2010/main" val="2539245944"/>
+      </p:ext>
+    </p:extLst>
+  </p:cSld>
+  <p:clrMapOvr>
+    <a:masterClrMapping/>
+  </p:clrMapOvr>
+</p:notes>
+</file>
+
+<file path=ppt/notesSlides/notesSlide16.xml><?xml version="1.0" encoding="utf-8"?>
+<p:notes xmlns:a="http://schemas.openxmlformats.org/drawingml/2006/main" xmlns:r="http://schemas.openxmlformats.org/officeDocument/2006/relationships" xmlns:p="http://schemas.openxmlformats.org/presentationml/2006/main">
+  <p:cSld>
+    <p:spTree>
+      <p:nvGrpSpPr>
+        <p:cNvPr id="1" name=""/>
+        <p:cNvGrpSpPr/>
+        <p:nvPr/>
+      </p:nvGrpSpPr>
+      <p:grpSpPr>
+        <a:xfrm>
+          <a:off x="0" y="0"/>
+          <a:ext cx="0" cy="0"/>
+          <a:chOff x="0" y="0"/>
+          <a:chExt cx="0" cy="0"/>
+        </a:xfrm>
+      </p:grpSpPr>
+      <p:sp>
+        <p:nvSpPr>
+          <p:cNvPr id="2" name="Slide Image Placeholder 1"/>
+          <p:cNvSpPr>
+            <a:spLocks noGrp="1" noRot="1" noChangeAspect="1"/>
+          </p:cNvSpPr>
+          <p:nvPr>
+            <p:ph type="sldImg"/>
+          </p:nvPr>
+        </p:nvSpPr>
+        <p:spPr/>
+      </p:sp>
+      <p:sp>
+        <p:nvSpPr>
+          <p:cNvPr id="3" name="Notes Placeholder 2"/>
+          <p:cNvSpPr>
+            <a:spLocks noGrp="1"/>
+          </p:cNvSpPr>
+          <p:nvPr>
+            <p:ph type="body" idx="1"/>
+          </p:nvPr>
+        </p:nvSpPr>
+        <p:spPr/>
+        <p:txBody>
+          <a:bodyPr/>
+          <a:lstStyle/>
+          <a:p>
+            <a:pPr marL="0" marR="0" indent="0" algn="l" defTabSz="914400" rtl="0" eaLnBrk="1" fontAlgn="auto" latinLnBrk="0" hangingPunct="1">
+              <a:lnSpc>
+                <a:spcPct val="100000"/>
+              </a:lnSpc>
+              <a:spcBef>
+                <a:spcPts val="0"/>
+              </a:spcBef>
+              <a:spcAft>
+                <a:spcPts val="0"/>
+              </a:spcAft>
+              <a:buClrTx/>
+              <a:buSzTx/>
+              <a:buFontTx/>
+              <a:buNone/>
+              <a:tabLst/>
+              <a:defRPr/>
+            </a:pPr>
+            <a:r>
+              <a:rPr lang="en-US" dirty="0" smtClean="0"/>
+              <a:t>Students will write</a:t>
+            </a:r>
+            <a:r>
+              <a:rPr lang="en-US" baseline="0" dirty="0" smtClean="0"/>
+              <a:t> code similar to this in the next lab to submit images uploaded to a Web site to the Computer Vision API in order to generate captions and search keywords. This example is written in JavaScript for Node.js.</a:t>
+            </a:r>
+            <a:endParaRPr lang="en-US" dirty="0" smtClean="0"/>
+          </a:p>
+          <a:p>
+            <a:endParaRPr lang="en-US" dirty="0"/>
+          </a:p>
+        </p:txBody>
+      </p:sp>
+      <p:sp>
+        <p:nvSpPr>
+          <p:cNvPr id="4" name="Slide Number Placeholder 3"/>
+          <p:cNvSpPr>
+            <a:spLocks noGrp="1"/>
+          </p:cNvSpPr>
+          <p:nvPr>
+            <p:ph type="sldNum" sz="quarter" idx="10"/>
+          </p:nvPr>
+        </p:nvSpPr>
+        <p:spPr/>
+        <p:txBody>
+          <a:bodyPr/>
+          <a:lstStyle/>
+          <a:p>
+            <a:fld id="{01283FAC-A721-45A3-BBDE-EAF2B09B7CD9}" type="slidenum">
+              <a:rPr lang="en-US" smtClean="0"/>
+              <a:t>22</a:t>
+            </a:fld>
+            <a:endParaRPr lang="en-US"/>
+          </a:p>
+        </p:txBody>
+      </p:sp>
+    </p:spTree>
+    <p:extLst>
+      <p:ext uri="{BB962C8B-B14F-4D97-AF65-F5344CB8AC3E}">
+        <p14:creationId xmlns:p14="http://schemas.microsoft.com/office/powerpoint/2010/main" val="2609303518"/>
+      </p:ext>
+    </p:extLst>
+  </p:cSld>
+  <p:clrMapOvr>
+    <a:masterClrMapping/>
+  </p:clrMapOvr>
+</p:notes>
+</file>
+
 <file path=ppt/notesSlides/notesSlide2.xml><?xml version="1.0" encoding="utf-8"?>
 <p:notes xmlns:a="http://schemas.openxmlformats.org/drawingml/2006/main" xmlns:r="http://schemas.openxmlformats.org/officeDocument/2006/relationships" xmlns:p="http://schemas.openxmlformats.org/presentationml/2006/main">
   <p:cSld>
@@ -617,35 +1338,216 @@
           <a:lstStyle/>
           <a:p>
             <a:r>
-              <a:rPr lang="en-US" dirty="0" smtClean="0"/>
-              <a:t>Locally redundant storage (LRS) maintains three copies of your data. LRS is replicated three times within a single facility in a single region. LRS protects your data from normal hardware failures, but not from the failure of a single facility. </a:t>
-            </a:r>
-          </a:p>
-          <a:p>
-            <a:endParaRPr lang="en-US" b="1" dirty="0" smtClean="0"/>
-          </a:p>
-          <a:p>
-            <a:r>
-              <a:rPr lang="en-US" dirty="0" smtClean="0"/>
-              <a:t>Zone-redundant storage (ZRS) maintains three copies of your data. ZRS is replicated three times across two to three facilities, either within a single region or across two regions, providing higher durability than LRS. ZRS ensures that your data is durable within a single region. </a:t>
-            </a:r>
-          </a:p>
-          <a:p>
-            <a:endParaRPr lang="en-US" dirty="0" smtClean="0"/>
-          </a:p>
-          <a:p>
-            <a:r>
-              <a:rPr lang="en-US" dirty="0" smtClean="0"/>
-              <a:t>Geo-redundant storage (GRS) is enabled for your storage account by default when you create it. GRS maintains six copies of your data. With GRS, your data is replicated three times within the primary region, and is also replicated three times in a secondary region hundreds of miles away from the primary region, providing the highest level of durability. In the event of a failure at the primary region, Azure Storage will failover to the secondary region. GRS ensures that your data is durable in two separate regions.</a:t>
-            </a:r>
-          </a:p>
-          <a:p>
-            <a:endParaRPr lang="en-US" dirty="0" smtClean="0"/>
-          </a:p>
-          <a:p>
-            <a:r>
-              <a:rPr lang="en-US" dirty="0" smtClean="0"/>
-              <a:t>Read access geo-redundant storage (RA-GRS) replicates your data to a secondary geographic location, and also provides read access to your data in the secondary location. Read-access geo-redundant storage allows you to access your data from either the primary or the secondary location, in the event that one location becomes unavailable.</a:t>
+              <a:rPr lang="en-US" sz="1200" b="0" i="0" kern="1200" dirty="0" smtClean="0">
+                <a:solidFill>
+                  <a:schemeClr val="tx1"/>
+                </a:solidFill>
+                <a:effectLst/>
+                <a:latin typeface="+mn-lt"/>
+                <a:ea typeface="+mn-ea"/>
+                <a:cs typeface="+mn-cs"/>
+              </a:rPr>
+              <a:t>Microsoft Azure Storage is a set of services that allows you to store large volumes of data in a cost-effective manner and in a way that makes the data readily and reliably available to services and applications that consume it. Data committed to Azure Storage can be stored in blobs, tables, queues, or files. </a:t>
+            </a:r>
+            <a:r>
+              <a:rPr lang="en-US" sz="1200" b="0" i="0" u="none" strike="noStrike" kern="1200" dirty="0" smtClean="0">
+                <a:solidFill>
+                  <a:schemeClr val="tx1"/>
+                </a:solidFill>
+                <a:effectLst/>
+                <a:latin typeface="+mn-lt"/>
+                <a:ea typeface="+mn-ea"/>
+                <a:cs typeface="+mn-cs"/>
+                <a:hlinkClick r:id="rId3"/>
+              </a:rPr>
+              <a:t>Azure blobs</a:t>
+            </a:r>
+            <a:r>
+              <a:rPr lang="en-US" sz="1200" b="0" i="0" kern="1200" dirty="0" smtClean="0">
+                <a:solidFill>
+                  <a:schemeClr val="tx1"/>
+                </a:solidFill>
+                <a:effectLst/>
+                <a:latin typeface="+mn-lt"/>
+                <a:ea typeface="+mn-ea"/>
+                <a:cs typeface="+mn-cs"/>
+              </a:rPr>
+              <a:t> are ideal for storing images, videos, and other types of data, and are frequently used to provide input to and capture output from other Azure services such as </a:t>
+            </a:r>
+            <a:r>
+              <a:rPr lang="en-US" sz="1200" b="0" i="0" u="none" strike="noStrike" kern="1200" dirty="0" smtClean="0">
+                <a:solidFill>
+                  <a:schemeClr val="tx1"/>
+                </a:solidFill>
+                <a:effectLst/>
+                <a:latin typeface="+mn-lt"/>
+                <a:ea typeface="+mn-ea"/>
+                <a:cs typeface="+mn-cs"/>
+                <a:hlinkClick r:id="rId4"/>
+              </a:rPr>
+              <a:t>Azure Stream Analytics</a:t>
+            </a:r>
+            <a:r>
+              <a:rPr lang="en-US" sz="1200" b="0" i="0" kern="1200" dirty="0" smtClean="0">
+                <a:solidFill>
+                  <a:schemeClr val="tx1"/>
+                </a:solidFill>
+                <a:effectLst/>
+                <a:latin typeface="+mn-lt"/>
+                <a:ea typeface="+mn-ea"/>
+                <a:cs typeface="+mn-cs"/>
+              </a:rPr>
+              <a:t>. </a:t>
+            </a:r>
+            <a:r>
+              <a:rPr lang="en-US" sz="1200" b="0" i="0" u="none" strike="noStrike" kern="1200" dirty="0" smtClean="0">
+                <a:solidFill>
+                  <a:schemeClr val="tx1"/>
+                </a:solidFill>
+                <a:effectLst/>
+                <a:latin typeface="+mn-lt"/>
+                <a:ea typeface="+mn-ea"/>
+                <a:cs typeface="+mn-cs"/>
+                <a:hlinkClick r:id="rId5"/>
+              </a:rPr>
+              <a:t>Azure tables</a:t>
+            </a:r>
+            <a:r>
+              <a:rPr lang="en-US" sz="1200" b="0" i="0" kern="1200" dirty="0" smtClean="0">
+                <a:solidFill>
+                  <a:schemeClr val="tx1"/>
+                </a:solidFill>
+                <a:effectLst/>
+                <a:latin typeface="+mn-lt"/>
+                <a:ea typeface="+mn-ea"/>
+                <a:cs typeface="+mn-cs"/>
+              </a:rPr>
+              <a:t> provide NoSQL storage for semi-structured data. </a:t>
+            </a:r>
+            <a:r>
+              <a:rPr lang="en-US" sz="1200" b="0" i="0" u="none" strike="noStrike" kern="1200" dirty="0" smtClean="0">
+                <a:solidFill>
+                  <a:schemeClr val="tx1"/>
+                </a:solidFill>
+                <a:effectLst/>
+                <a:latin typeface="+mn-lt"/>
+                <a:ea typeface="+mn-ea"/>
+                <a:cs typeface="+mn-cs"/>
+                <a:hlinkClick r:id="rId6"/>
+              </a:rPr>
+              <a:t>Azure </a:t>
+            </a:r>
+            <a:r>
+              <a:rPr lang="en-US" sz="1200" b="0" i="0" u="none" strike="noStrike" kern="1200" dirty="0" err="1" smtClean="0">
+                <a:solidFill>
+                  <a:schemeClr val="tx1"/>
+                </a:solidFill>
+                <a:effectLst/>
+                <a:latin typeface="+mn-lt"/>
+                <a:ea typeface="+mn-ea"/>
+                <a:cs typeface="+mn-cs"/>
+                <a:hlinkClick r:id="rId6"/>
+              </a:rPr>
+              <a:t>queues</a:t>
+            </a:r>
+            <a:r>
+              <a:rPr lang="en-US" sz="1200" b="0" i="0" kern="1200" dirty="0" err="1" smtClean="0">
+                <a:solidFill>
+                  <a:schemeClr val="tx1"/>
+                </a:solidFill>
+                <a:effectLst/>
+                <a:latin typeface="+mn-lt"/>
+                <a:ea typeface="+mn-ea"/>
+                <a:cs typeface="+mn-cs"/>
+              </a:rPr>
+              <a:t>support</a:t>
+            </a:r>
+            <a:r>
+              <a:rPr lang="en-US" sz="1200" b="0" i="0" kern="1200" dirty="0" smtClean="0">
+                <a:solidFill>
+                  <a:schemeClr val="tx1"/>
+                </a:solidFill>
+                <a:effectLst/>
+                <a:latin typeface="+mn-lt"/>
+                <a:ea typeface="+mn-ea"/>
+                <a:cs typeface="+mn-cs"/>
+              </a:rPr>
+              <a:t> queued message transfers between applications (or parts of applications) and can be used to make applications more scalable and robust by loosely coupling them together. Finally, </a:t>
+            </a:r>
+            <a:r>
+              <a:rPr lang="en-US" sz="1200" b="0" i="0" u="none" strike="noStrike" kern="1200" dirty="0" smtClean="0">
+                <a:solidFill>
+                  <a:schemeClr val="tx1"/>
+                </a:solidFill>
+                <a:effectLst/>
+                <a:latin typeface="+mn-lt"/>
+                <a:ea typeface="+mn-ea"/>
+                <a:cs typeface="+mn-cs"/>
+                <a:hlinkClick r:id="rId7"/>
+              </a:rPr>
+              <a:t>Azure Files</a:t>
+            </a:r>
+            <a:r>
+              <a:rPr lang="en-US" sz="1200" b="0" i="0" kern="1200" dirty="0" smtClean="0">
+                <a:solidFill>
+                  <a:schemeClr val="tx1"/>
+                </a:solidFill>
+                <a:effectLst/>
+                <a:latin typeface="+mn-lt"/>
+                <a:ea typeface="+mn-ea"/>
+                <a:cs typeface="+mn-cs"/>
+              </a:rPr>
+              <a:t> use the Server Message Block (SMB) protocol to share files through the cloud and access storage as network drives.</a:t>
+            </a:r>
+          </a:p>
+          <a:p>
+            <a:endParaRPr lang="en-US" sz="1200" b="0" i="0" kern="1200" dirty="0" smtClean="0">
+              <a:solidFill>
+                <a:schemeClr val="tx1"/>
+              </a:solidFill>
+              <a:effectLst/>
+              <a:latin typeface="+mn-lt"/>
+              <a:ea typeface="+mn-ea"/>
+              <a:cs typeface="+mn-cs"/>
+            </a:endParaRPr>
+          </a:p>
+          <a:p>
+            <a:r>
+              <a:rPr lang="en-US" sz="1200" b="0" i="0" kern="1200" dirty="0" smtClean="0">
+                <a:solidFill>
+                  <a:schemeClr val="tx1"/>
+                </a:solidFill>
+                <a:effectLst/>
+                <a:latin typeface="+mn-lt"/>
+                <a:ea typeface="+mn-ea"/>
+                <a:cs typeface="+mn-cs"/>
+              </a:rPr>
+              <a:t>Data stored in Microsoft Azure Storage can be accessed over HTTP or HTTPS using straightforward REST APIs, or it can be accessed using rich client libraries available for many popular languages and platforms, including .NET, Java, Android, Node.js, PHP, Ruby, and Python. The </a:t>
+            </a:r>
+            <a:r>
+              <a:rPr lang="en-US" sz="1200" b="0" i="0" u="none" strike="noStrike" kern="1200" dirty="0" smtClean="0">
+                <a:solidFill>
+                  <a:schemeClr val="tx1"/>
+                </a:solidFill>
+                <a:effectLst/>
+                <a:latin typeface="+mn-lt"/>
+                <a:ea typeface="+mn-ea"/>
+                <a:cs typeface="+mn-cs"/>
+                <a:hlinkClick r:id="rId8"/>
+              </a:rPr>
+              <a:t>Azure Portal</a:t>
+            </a:r>
+            <a:r>
+              <a:rPr lang="en-US" sz="1200" b="0" i="0" kern="1200" dirty="0" smtClean="0">
+                <a:solidFill>
+                  <a:schemeClr val="tx1"/>
+                </a:solidFill>
+                <a:effectLst/>
+                <a:latin typeface="+mn-lt"/>
+                <a:ea typeface="+mn-ea"/>
+                <a:cs typeface="+mn-cs"/>
+              </a:rPr>
+              <a:t> includes features for working with Azure Storage, but richer functionality is available from third-party tools, many of which are free and some of which work cross-platform</a:t>
             </a:r>
           </a:p>
           <a:p>
@@ -670,7 +1572,7 @@
           <a:p>
             <a:fld id="{01283FAC-A721-45A3-BBDE-EAF2B09B7CD9}" type="slidenum">
               <a:rPr lang="en-US" smtClean="0"/>
-              <a:t>5</a:t>
+              <a:t>2</a:t>
             </a:fld>
             <a:endParaRPr lang="en-US"/>
           </a:p>
@@ -679,7 +1581,7 @@
     </p:spTree>
     <p:extLst>
       <p:ext uri="{BB962C8B-B14F-4D97-AF65-F5344CB8AC3E}">
-        <p14:creationId xmlns:p14="http://schemas.microsoft.com/office/powerpoint/2010/main" val="1384190109"/>
+        <p14:creationId xmlns:p14="http://schemas.microsoft.com/office/powerpoint/2010/main" val="299610188"/>
       </p:ext>
     </p:extLst>
   </p:cSld>
@@ -733,40 +1635,15 @@
           <a:bodyPr/>
           <a:lstStyle/>
           <a:p>
-            <a:pPr marL="0" marR="0" indent="0" algn="l" defTabSz="914400" rtl="0" eaLnBrk="1" fontAlgn="auto" latinLnBrk="0" hangingPunct="1">
-              <a:lnSpc>
-                <a:spcPct val="100000"/>
-              </a:lnSpc>
-              <a:spcBef>
-                <a:spcPts val="0"/>
-              </a:spcBef>
-              <a:spcAft>
-                <a:spcPts val="0"/>
-              </a:spcAft>
-              <a:buClrTx/>
-              <a:buSzTx/>
-              <a:buFontTx/>
-              <a:buNone/>
-              <a:tabLst/>
-              <a:defRPr/>
-            </a:pPr>
             <a:r>
               <a:rPr lang="en-US" dirty="0" smtClean="0"/>
-              <a:t>Access keys should </a:t>
-            </a:r>
-            <a:r>
-              <a:rPr lang="en-US" u="sng" dirty="0" smtClean="0"/>
-              <a:t>never</a:t>
+              <a:t>Storage begins with a storage account, which can be created in the Azure Portal. Before you can create a blob, you must create a container to store it in. Think of containers as folders in a file system and blobs as the files themselves. Storage accounts must be uniquely named and conform</a:t>
             </a:r>
             <a:r>
               <a:rPr lang="en-US" baseline="0" dirty="0" smtClean="0"/>
-              <a:t> be handed out to other people because they provide unlimited access to a storage account. SAS tokens are safer because they can be time-limited and set to provide read-only access. The best way to generate a SAS token is with Microsoft's cross-platform Azure Storage Explorer</a:t>
-            </a:r>
-            <a:r>
-              <a:rPr lang="en-US" baseline="0" dirty="0" smtClean="0"/>
-              <a:t>. For a real-world example of what happens when you fail to protect a storage account's access keys, see http://www.pcworld.com/article/2365602/hacker-puts-full-redundancy-codehosting-firm-out-of-business.html.</a:t>
-            </a:r>
-            <a:endParaRPr lang="en-US" dirty="0" smtClean="0"/>
+              <a:t> to a rather severe set of restrictions since storage names are used to form DNS names.</a:t>
+            </a:r>
+            <a:endParaRPr lang="en-US" dirty="0"/>
           </a:p>
         </p:txBody>
       </p:sp>
@@ -787,7 +1664,7 @@
           <a:p>
             <a:fld id="{01283FAC-A721-45A3-BBDE-EAF2B09B7CD9}" type="slidenum">
               <a:rPr lang="en-US" smtClean="0"/>
-              <a:t>6</a:t>
+              <a:t>3</a:t>
             </a:fld>
             <a:endParaRPr lang="en-US"/>
           </a:p>
@@ -796,7 +1673,7 @@
     </p:spTree>
     <p:extLst>
       <p:ext uri="{BB962C8B-B14F-4D97-AF65-F5344CB8AC3E}">
-        <p14:creationId xmlns:p14="http://schemas.microsoft.com/office/powerpoint/2010/main" val="1448603169"/>
+        <p14:creationId xmlns:p14="http://schemas.microsoft.com/office/powerpoint/2010/main" val="2850437580"/>
       </p:ext>
     </p:extLst>
   </p:cSld>
@@ -850,32 +1727,15 @@
           <a:bodyPr/>
           <a:lstStyle/>
           <a:p>
-            <a:pPr marL="0" marR="0" indent="0" algn="l" defTabSz="914400" rtl="0" eaLnBrk="1" fontAlgn="auto" latinLnBrk="0" hangingPunct="1">
-              <a:lnSpc>
-                <a:spcPct val="100000"/>
-              </a:lnSpc>
-              <a:spcBef>
-                <a:spcPts val="0"/>
-              </a:spcBef>
-              <a:spcAft>
-                <a:spcPts val="0"/>
-              </a:spcAft>
-              <a:buClrTx/>
-              <a:buSzTx/>
-              <a:buFontTx/>
-              <a:buNone/>
-              <a:tabLst/>
-              <a:defRPr/>
-            </a:pPr>
             <a:r>
               <a:rPr lang="en-US" dirty="0" smtClean="0"/>
-              <a:t>The Microsoft Azure Storage Explorer provides an easy-to-use</a:t>
+              <a:t>Once created, a blob can be referenced by URL. The URL is formed from the storage-account name, container name, and blob name. This doesn't mean all blobs are public; they're private</a:t>
             </a:r>
             <a:r>
               <a:rPr lang="en-US" baseline="0" dirty="0" smtClean="0"/>
-              <a:t> GUI interface for creating containers, uploading and downloading blobs, generating SAS tokens, and more. But if you want to use a scripting language such as Bash or PowerShell to script storage operations, the Azure CLI is the way to go.</a:t>
-            </a:r>
-            <a:endParaRPr lang="en-US" dirty="0" smtClean="0"/>
+              <a:t> by default. But they can be made public, and public blobs can be downloaded simply by typing their URLs into a browser.</a:t>
+            </a:r>
+            <a:endParaRPr lang="en-US" dirty="0"/>
           </a:p>
         </p:txBody>
       </p:sp>
@@ -896,7 +1756,7 @@
           <a:p>
             <a:fld id="{01283FAC-A721-45A3-BBDE-EAF2B09B7CD9}" type="slidenum">
               <a:rPr lang="en-US" smtClean="0"/>
-              <a:t>10</a:t>
+              <a:t>4</a:t>
             </a:fld>
             <a:endParaRPr lang="en-US"/>
           </a:p>
@@ -905,7 +1765,7 @@
     </p:spTree>
     <p:extLst>
       <p:ext uri="{BB962C8B-B14F-4D97-AF65-F5344CB8AC3E}">
-        <p14:creationId xmlns:p14="http://schemas.microsoft.com/office/powerpoint/2010/main" val="2058981737"/>
+        <p14:creationId xmlns:p14="http://schemas.microsoft.com/office/powerpoint/2010/main" val="2003229336"/>
       </p:ext>
     </p:extLst>
   </p:cSld>
@@ -961,12 +1821,37 @@
           <a:p>
             <a:r>
               <a:rPr lang="en-US" dirty="0" smtClean="0"/>
-              <a:t>Cognitive</a:t>
-            </a:r>
-            <a:r>
-              <a:rPr lang="en-US" baseline="0" dirty="0" smtClean="0"/>
-              <a:t> Services includes 21 APIs that fall into five categories: vision, speech, language, knowledge, and search.</a:t>
-            </a:r>
+              <a:t>Locally redundant storage (LRS) maintains three copies of your data. LRS is replicated three times within a single facility in a single region. LRS protects your data from normal hardware failures, but not from the failure of a single facility. </a:t>
+            </a:r>
+          </a:p>
+          <a:p>
+            <a:endParaRPr lang="en-US" b="1" dirty="0" smtClean="0"/>
+          </a:p>
+          <a:p>
+            <a:r>
+              <a:rPr lang="en-US" dirty="0" smtClean="0"/>
+              <a:t>Zone-redundant storage (ZRS) maintains three copies of your data. ZRS is replicated three times across two to three facilities, either within a single region or across two regions, providing higher durability than LRS. ZRS ensures that your data is durable within a single region. </a:t>
+            </a:r>
+          </a:p>
+          <a:p>
+            <a:endParaRPr lang="en-US" dirty="0" smtClean="0"/>
+          </a:p>
+          <a:p>
+            <a:r>
+              <a:rPr lang="en-US" dirty="0" smtClean="0"/>
+              <a:t>Geo-redundant storage (GRS) is enabled for your storage account by default when you create it. GRS maintains six copies of your data. With GRS, your data is replicated three times within the primary region, and is also replicated three times in a secondary region hundreds of miles away from the primary region, providing the highest level of durability. In the event of a failure at the primary region, Azure Storage will failover to the secondary region. GRS ensures that your data is durable in two separate regions.</a:t>
+            </a:r>
+          </a:p>
+          <a:p>
+            <a:endParaRPr lang="en-US" dirty="0" smtClean="0"/>
+          </a:p>
+          <a:p>
+            <a:r>
+              <a:rPr lang="en-US" dirty="0" smtClean="0"/>
+              <a:t>Read access geo-redundant storage (RA-GRS) replicates your data to a secondary geographic location, and also provides read access to your data in the secondary location. Read-access geo-redundant storage allows you to access your data from either the primary or the secondary location, in the event that one location becomes unavailable.</a:t>
+            </a:r>
+          </a:p>
+          <a:p>
             <a:endParaRPr lang="en-US" dirty="0"/>
           </a:p>
         </p:txBody>
@@ -988,7 +1873,7 @@
           <a:p>
             <a:fld id="{01283FAC-A721-45A3-BBDE-EAF2B09B7CD9}" type="slidenum">
               <a:rPr lang="en-US" smtClean="0"/>
-              <a:t>18</a:t>
+              <a:t>5</a:t>
             </a:fld>
             <a:endParaRPr lang="en-US"/>
           </a:p>
@@ -997,7 +1882,7 @@
     </p:spTree>
     <p:extLst>
       <p:ext uri="{BB962C8B-B14F-4D97-AF65-F5344CB8AC3E}">
-        <p14:creationId xmlns:p14="http://schemas.microsoft.com/office/powerpoint/2010/main" val="1813930632"/>
+        <p14:creationId xmlns:p14="http://schemas.microsoft.com/office/powerpoint/2010/main" val="1384190109"/>
       </p:ext>
     </p:extLst>
   </p:cSld>
@@ -1051,55 +1936,52 @@
           <a:bodyPr/>
           <a:lstStyle/>
           <a:p>
-            <a:r>
-              <a:rPr lang="en-US" sz="1200" b="0" i="0" kern="1200" dirty="0" smtClean="0">
-                <a:solidFill>
-                  <a:schemeClr val="tx1"/>
-                </a:solidFill>
-                <a:effectLst/>
-                <a:latin typeface="+mn-lt"/>
-                <a:ea typeface="+mn-ea"/>
-                <a:cs typeface="+mn-cs"/>
-              </a:rPr>
-              <a:t> </a:t>
-            </a:r>
-            <a:r>
-              <a:rPr lang="en-US" sz="1200" b="0" i="0" u="none" strike="noStrike" kern="1200" dirty="0" smtClean="0">
-                <a:solidFill>
-                  <a:schemeClr val="tx1"/>
-                </a:solidFill>
-                <a:effectLst/>
-                <a:latin typeface="+mn-lt"/>
-                <a:ea typeface="+mn-ea"/>
-                <a:cs typeface="+mn-cs"/>
-              </a:rPr>
-              <a:t>Microsoft Cognitive Services</a:t>
-            </a:r>
-            <a:r>
-              <a:rPr lang="en-US" sz="1200" b="0" i="0" u="none" strike="noStrike" kern="1200" baseline="0" dirty="0" smtClean="0">
-                <a:solidFill>
-                  <a:schemeClr val="tx1"/>
-                </a:solidFill>
-                <a:effectLst/>
-                <a:latin typeface="+mn-lt"/>
-                <a:ea typeface="+mn-ea"/>
-                <a:cs typeface="+mn-cs"/>
-              </a:rPr>
-              <a:t> is </a:t>
-            </a:r>
-            <a:r>
-              <a:rPr lang="en-US" sz="1200" b="0" i="0" kern="1200" dirty="0" smtClean="0">
-                <a:solidFill>
-                  <a:schemeClr val="tx1"/>
-                </a:solidFill>
-                <a:effectLst/>
-                <a:latin typeface="+mn-lt"/>
-                <a:ea typeface="+mn-ea"/>
-                <a:cs typeface="+mn-cs"/>
-              </a:rPr>
-              <a:t>a set of intelligent APIs for building equally intelligent applications. It currently offers 21 different API for analyzing images, videos, text, and much more. For more information, visit https://www.microsoft.com/cognitive-services.</a:t>
-            </a:r>
-            <a:endParaRPr lang="en-US" dirty="0"/>
+            <a:pPr marL="0" marR="0" indent="0" algn="l" defTabSz="914400" rtl="0" eaLnBrk="1" fontAlgn="auto" latinLnBrk="0" hangingPunct="1">
+              <a:lnSpc>
+                <a:spcPct val="100000"/>
+              </a:lnSpc>
+              <a:spcBef>
+                <a:spcPts val="0"/>
+              </a:spcBef>
+              <a:spcAft>
+                <a:spcPts val="0"/>
+              </a:spcAft>
+              <a:buClrTx/>
+              <a:buSzTx/>
+              <a:buFontTx/>
+              <a:buNone/>
+              <a:tabLst/>
+              <a:defRPr/>
+            </a:pPr>
+            <a:r>
+              <a:rPr lang="en-US" dirty="0" smtClean="0"/>
+              <a:t>Access keys should </a:t>
+            </a:r>
+            <a:r>
+              <a:rPr lang="en-US" u="sng" dirty="0" smtClean="0"/>
+              <a:t>never</a:t>
+            </a:r>
+            <a:r>
+              <a:rPr lang="en-US" baseline="0" dirty="0" smtClean="0"/>
+              <a:t> be handed out to other people because they provide </a:t>
+            </a:r>
+            <a:r>
+              <a:rPr lang="en-US" baseline="0" dirty="0" smtClean="0"/>
+              <a:t>unrestricted </a:t>
+            </a:r>
+            <a:r>
+              <a:rPr lang="en-US" baseline="0" dirty="0" smtClean="0"/>
+              <a:t>access to a storage account. </a:t>
+            </a:r>
+            <a:r>
+              <a:rPr lang="en-US" baseline="0" dirty="0" smtClean="0"/>
+              <a:t>(They're useful for connecting other services that you create to your storage accounts, in which case they stay in Azure and are never divulged to the outside world.) SAS </a:t>
+            </a:r>
+            <a:r>
+              <a:rPr lang="en-US" baseline="0" dirty="0" smtClean="0"/>
+              <a:t>tokens are safer because they can be time-limited and set to provide read-only access. The best way to generate a SAS token is with Microsoft's cross-platform Azure Storage Explorer. For a real-world example of what happens when you fail to protect a storage account's access keys, see http://www.pcworld.com/article/2365602/hacker-puts-full-redundancy-codehosting-firm-out-of-business.html.</a:t>
+            </a:r>
+            <a:endParaRPr lang="en-US" dirty="0" smtClean="0"/>
           </a:p>
         </p:txBody>
       </p:sp>
@@ -1120,7 +2002,7 @@
           <a:p>
             <a:fld id="{01283FAC-A721-45A3-BBDE-EAF2B09B7CD9}" type="slidenum">
               <a:rPr lang="en-US" smtClean="0"/>
-              <a:t>19</a:t>
+              <a:t>6</a:t>
             </a:fld>
             <a:endParaRPr lang="en-US"/>
           </a:p>
@@ -1129,7 +2011,7 @@
     </p:spTree>
     <p:extLst>
       <p:ext uri="{BB962C8B-B14F-4D97-AF65-F5344CB8AC3E}">
-        <p14:creationId xmlns:p14="http://schemas.microsoft.com/office/powerpoint/2010/main" val="2599400582"/>
+        <p14:creationId xmlns:p14="http://schemas.microsoft.com/office/powerpoint/2010/main" val="1448603169"/>
       </p:ext>
     </p:extLst>
   </p:cSld>
@@ -1185,11 +2067,11 @@
           <a:p>
             <a:r>
               <a:rPr lang="en-US" dirty="0" smtClean="0"/>
-              <a:t>The Computer Vision API, part of Cognitive</a:t>
+              <a:t>This</a:t>
             </a:r>
             <a:r>
               <a:rPr lang="en-US" baseline="0" dirty="0" smtClean="0"/>
-              <a:t> Services, offers methods for captioning images, generating metadata keywords, recognizing celebrities, reading text, and generating "smart" thumbnails. For more information, visit https://www.microsoft.com/cognitive-services/en-us/computer-vision-api.</a:t>
+              <a:t> example shows how a SAS included in a query string can be used to provide access to an otherwise private blob. Could someone modify the query string to extend the lifetime of the SAS? They could try, but the SAS is digitally signed, so Azure will reject a modified SAS.</a:t>
             </a:r>
             <a:endParaRPr lang="en-US" dirty="0"/>
           </a:p>
@@ -1212,7 +2094,7 @@
           <a:p>
             <a:fld id="{01283FAC-A721-45A3-BBDE-EAF2B09B7CD9}" type="slidenum">
               <a:rPr lang="en-US" smtClean="0"/>
-              <a:t>20</a:t>
+              <a:t>7</a:t>
             </a:fld>
             <a:endParaRPr lang="en-US"/>
           </a:p>
@@ -1221,7 +2103,195 @@
     </p:spTree>
     <p:extLst>
       <p:ext uri="{BB962C8B-B14F-4D97-AF65-F5344CB8AC3E}">
-        <p14:creationId xmlns:p14="http://schemas.microsoft.com/office/powerpoint/2010/main" val="3186057134"/>
+        <p14:creationId xmlns:p14="http://schemas.microsoft.com/office/powerpoint/2010/main" val="890548416"/>
+      </p:ext>
+    </p:extLst>
+  </p:cSld>
+  <p:clrMapOvr>
+    <a:masterClrMapping/>
+  </p:clrMapOvr>
+</p:notes>
+</file>
+
+<file path=ppt/notesSlides/notesSlide8.xml><?xml version="1.0" encoding="utf-8"?>
+<p:notes xmlns:a="http://schemas.openxmlformats.org/drawingml/2006/main" xmlns:r="http://schemas.openxmlformats.org/officeDocument/2006/relationships" xmlns:p="http://schemas.openxmlformats.org/presentationml/2006/main">
+  <p:cSld>
+    <p:spTree>
+      <p:nvGrpSpPr>
+        <p:cNvPr id="1" name=""/>
+        <p:cNvGrpSpPr/>
+        <p:nvPr/>
+      </p:nvGrpSpPr>
+      <p:grpSpPr>
+        <a:xfrm>
+          <a:off x="0" y="0"/>
+          <a:ext cx="0" cy="0"/>
+          <a:chOff x="0" y="0"/>
+          <a:chExt cx="0" cy="0"/>
+        </a:xfrm>
+      </p:grpSpPr>
+      <p:sp>
+        <p:nvSpPr>
+          <p:cNvPr id="2" name="Slide Image Placeholder 1"/>
+          <p:cNvSpPr>
+            <a:spLocks noGrp="1" noRot="1" noChangeAspect="1"/>
+          </p:cNvSpPr>
+          <p:nvPr>
+            <p:ph type="sldImg"/>
+          </p:nvPr>
+        </p:nvSpPr>
+        <p:spPr/>
+      </p:sp>
+      <p:sp>
+        <p:nvSpPr>
+          <p:cNvPr id="3" name="Notes Placeholder 2"/>
+          <p:cNvSpPr>
+            <a:spLocks noGrp="1"/>
+          </p:cNvSpPr>
+          <p:nvPr>
+            <p:ph type="body" idx="1"/>
+          </p:nvPr>
+        </p:nvSpPr>
+        <p:spPr/>
+        <p:txBody>
+          <a:bodyPr/>
+          <a:lstStyle/>
+          <a:p>
+            <a:r>
+              <a:rPr lang="en-US" dirty="0" smtClean="0"/>
+              <a:t>Containers are private by default, which means only the storage-account owner (or someone who has an</a:t>
+            </a:r>
+            <a:r>
+              <a:rPr lang="en-US" baseline="0" dirty="0" smtClean="0"/>
+              <a:t> access key for the storage account or a valid SAS) can access its contents. However, setting the container's access policy to "Public Container" or "Public Blob" makes the container's blobs public. The difference between </a:t>
+            </a:r>
+            <a:r>
+              <a:rPr lang="en-US" baseline="0" dirty="0" smtClean="0"/>
+              <a:t>"Public Container" and "Public Blob" is that the latter allows the blobs in the container to be enumerated, while the latter does not.</a:t>
+            </a:r>
+            <a:endParaRPr lang="en-US" dirty="0"/>
+          </a:p>
+        </p:txBody>
+      </p:sp>
+      <p:sp>
+        <p:nvSpPr>
+          <p:cNvPr id="4" name="Slide Number Placeholder 3"/>
+          <p:cNvSpPr>
+            <a:spLocks noGrp="1"/>
+          </p:cNvSpPr>
+          <p:nvPr>
+            <p:ph type="sldNum" sz="quarter" idx="10"/>
+          </p:nvPr>
+        </p:nvSpPr>
+        <p:spPr/>
+        <p:txBody>
+          <a:bodyPr/>
+          <a:lstStyle/>
+          <a:p>
+            <a:fld id="{01283FAC-A721-45A3-BBDE-EAF2B09B7CD9}" type="slidenum">
+              <a:rPr lang="en-US" smtClean="0"/>
+              <a:t>8</a:t>
+            </a:fld>
+            <a:endParaRPr lang="en-US"/>
+          </a:p>
+        </p:txBody>
+      </p:sp>
+    </p:spTree>
+    <p:extLst>
+      <p:ext uri="{BB962C8B-B14F-4D97-AF65-F5344CB8AC3E}">
+        <p14:creationId xmlns:p14="http://schemas.microsoft.com/office/powerpoint/2010/main" val="2687889035"/>
+      </p:ext>
+    </p:extLst>
+  </p:cSld>
+  <p:clrMapOvr>
+    <a:masterClrMapping/>
+  </p:clrMapOvr>
+</p:notes>
+</file>
+
+<file path=ppt/notesSlides/notesSlide9.xml><?xml version="1.0" encoding="utf-8"?>
+<p:notes xmlns:a="http://schemas.openxmlformats.org/drawingml/2006/main" xmlns:r="http://schemas.openxmlformats.org/officeDocument/2006/relationships" xmlns:p="http://schemas.openxmlformats.org/presentationml/2006/main">
+  <p:cSld>
+    <p:spTree>
+      <p:nvGrpSpPr>
+        <p:cNvPr id="1" name=""/>
+        <p:cNvGrpSpPr/>
+        <p:nvPr/>
+      </p:nvGrpSpPr>
+      <p:grpSpPr>
+        <a:xfrm>
+          <a:off x="0" y="0"/>
+          <a:ext cx="0" cy="0"/>
+          <a:chOff x="0" y="0"/>
+          <a:chExt cx="0" cy="0"/>
+        </a:xfrm>
+      </p:grpSpPr>
+      <p:sp>
+        <p:nvSpPr>
+          <p:cNvPr id="2" name="Slide Image Placeholder 1"/>
+          <p:cNvSpPr>
+            <a:spLocks noGrp="1" noRot="1" noChangeAspect="1"/>
+          </p:cNvSpPr>
+          <p:nvPr>
+            <p:ph type="sldImg"/>
+          </p:nvPr>
+        </p:nvSpPr>
+        <p:spPr/>
+      </p:sp>
+      <p:sp>
+        <p:nvSpPr>
+          <p:cNvPr id="3" name="Notes Placeholder 2"/>
+          <p:cNvSpPr>
+            <a:spLocks noGrp="1"/>
+          </p:cNvSpPr>
+          <p:nvPr>
+            <p:ph type="body" idx="1"/>
+          </p:nvPr>
+        </p:nvSpPr>
+        <p:spPr/>
+        <p:txBody>
+          <a:bodyPr/>
+          <a:lstStyle/>
+          <a:p>
+            <a:r>
+              <a:rPr lang="en-US" dirty="0" smtClean="0"/>
+              <a:t>Most blobs are block blobs. Page blobs are for VHDs and are used for VMs created in Azure. Most tools that let you create blobs --</a:t>
+            </a:r>
+            <a:r>
+              <a:rPr lang="en-US" baseline="0" dirty="0" smtClean="0"/>
+              <a:t> for example, the Microsoft Azure Storage Explorer -- let you specify the blob type. APIs for creating blobs also let you specify the blob type.</a:t>
+            </a:r>
+            <a:endParaRPr lang="en-US" dirty="0"/>
+          </a:p>
+        </p:txBody>
+      </p:sp>
+      <p:sp>
+        <p:nvSpPr>
+          <p:cNvPr id="4" name="Slide Number Placeholder 3"/>
+          <p:cNvSpPr>
+            <a:spLocks noGrp="1"/>
+          </p:cNvSpPr>
+          <p:nvPr>
+            <p:ph type="sldNum" sz="quarter" idx="10"/>
+          </p:nvPr>
+        </p:nvSpPr>
+        <p:spPr/>
+        <p:txBody>
+          <a:bodyPr/>
+          <a:lstStyle/>
+          <a:p>
+            <a:fld id="{01283FAC-A721-45A3-BBDE-EAF2B09B7CD9}" type="slidenum">
+              <a:rPr lang="en-US" smtClean="0"/>
+              <a:t>9</a:t>
+            </a:fld>
+            <a:endParaRPr lang="en-US"/>
+          </a:p>
+        </p:txBody>
+      </p:sp>
+    </p:spTree>
+    <p:extLst>
+      <p:ext uri="{BB962C8B-B14F-4D97-AF65-F5344CB8AC3E}">
+        <p14:creationId xmlns:p14="http://schemas.microsoft.com/office/powerpoint/2010/main" val="1446334449"/>
       </p:ext>
     </p:extLst>
   </p:cSld>
@@ -1378,7 +2448,7 @@
           <a:p>
             <a:fld id="{0459C166-16D3-4A25-A2F8-C51E0E346B22}" type="datetimeFigureOut">
               <a:rPr lang="en-US" smtClean="0"/>
-              <a:t>6/21/2016</a:t>
+              <a:t>6/22/2016</a:t>
             </a:fld>
             <a:endParaRPr lang="en-US"/>
           </a:p>
@@ -1473,7 +2543,7 @@
           <a:p>
             <a:fld id="{0459C166-16D3-4A25-A2F8-C51E0E346B22}" type="datetimeFigureOut">
               <a:rPr lang="en-US" smtClean="0"/>
-              <a:t>6/21/2016</a:t>
+              <a:t>6/22/2016</a:t>
             </a:fld>
             <a:endParaRPr lang="en-US"/>
           </a:p>
@@ -1748,7 +2818,7 @@
           <a:p>
             <a:fld id="{0459C166-16D3-4A25-A2F8-C51E0E346B22}" type="datetimeFigureOut">
               <a:rPr lang="en-US" smtClean="0"/>
-              <a:t>6/21/2016</a:t>
+              <a:t>6/22/2016</a:t>
             </a:fld>
             <a:endParaRPr lang="en-US"/>
           </a:p>
@@ -2000,7 +3070,7 @@
           <a:p>
             <a:fld id="{0459C166-16D3-4A25-A2F8-C51E0E346B22}" type="datetimeFigureOut">
               <a:rPr lang="en-US" smtClean="0"/>
-              <a:t>6/21/2016</a:t>
+              <a:t>6/22/2016</a:t>
             </a:fld>
             <a:endParaRPr lang="en-US"/>
           </a:p>
@@ -2168,7 +3238,7 @@
           <a:p>
             <a:fld id="{0459C166-16D3-4A25-A2F8-C51E0E346B22}" type="datetimeFigureOut">
               <a:rPr lang="en-US" smtClean="0"/>
-              <a:t>6/21/2016</a:t>
+              <a:t>6/22/2016</a:t>
             </a:fld>
             <a:endParaRPr lang="en-US"/>
           </a:p>
@@ -2346,7 +3416,7 @@
           <a:p>
             <a:fld id="{0459C166-16D3-4A25-A2F8-C51E0E346B22}" type="datetimeFigureOut">
               <a:rPr lang="en-US" smtClean="0"/>
-              <a:t>6/21/2016</a:t>
+              <a:t>6/22/2016</a:t>
             </a:fld>
             <a:endParaRPr lang="en-US"/>
           </a:p>
@@ -4273,7 +5343,7 @@
           <a:p>
             <a:fld id="{0459C166-16D3-4A25-A2F8-C51E0E346B22}" type="datetimeFigureOut">
               <a:rPr lang="en-US" smtClean="0"/>
-              <a:t>6/21/2016</a:t>
+              <a:t>6/22/2016</a:t>
             </a:fld>
             <a:endParaRPr lang="en-US"/>
           </a:p>
@@ -9900,7 +10970,7 @@
             <a:fld id="{0459C166-16D3-4A25-A2F8-C51E0E346B22}" type="datetimeFigureOut">
               <a:rPr lang="en-US" smtClean="0"/>
               <a:pPr/>
-              <a:t>6/21/2016</a:t>
+              <a:t>6/22/2016</a:t>
             </a:fld>
             <a:endParaRPr lang="en-US"/>
           </a:p>
@@ -13962,7 +15032,7 @@
           <a:p>
             <a:fld id="{0459C166-16D3-4A25-A2F8-C51E0E346B22}" type="datetimeFigureOut">
               <a:rPr lang="en-US" smtClean="0"/>
-              <a:t>6/21/2016</a:t>
+              <a:t>6/22/2016</a:t>
             </a:fld>
             <a:endParaRPr lang="en-US"/>
           </a:p>
@@ -14326,7 +15396,7 @@
           <a:p>
             <a:fld id="{0459C166-16D3-4A25-A2F8-C51E0E346B22}" type="datetimeFigureOut">
               <a:rPr lang="en-US" smtClean="0"/>
-              <a:t>6/21/2016</a:t>
+              <a:t>6/22/2016</a:t>
             </a:fld>
             <a:endParaRPr lang="en-US"/>
           </a:p>
@@ -14443,7 +15513,7 @@
           <a:p>
             <a:fld id="{0459C166-16D3-4A25-A2F8-C51E0E346B22}" type="datetimeFigureOut">
               <a:rPr lang="en-US" smtClean="0"/>
-              <a:t>6/21/2016</a:t>
+              <a:t>6/22/2016</a:t>
             </a:fld>
             <a:endParaRPr lang="en-US"/>
           </a:p>
@@ -14654,7 +15724,7 @@
           <a:p>
             <a:fld id="{0459C166-16D3-4A25-A2F8-C51E0E346B22}" type="datetimeFigureOut">
               <a:rPr lang="en-US" smtClean="0"/>
-              <a:t>6/21/2016</a:t>
+              <a:t>6/22/2016</a:t>
             </a:fld>
             <a:endParaRPr lang="en-US"/>
           </a:p>
@@ -22136,33 +23206,17 @@
           <a:p>
             <a:r>
               <a:rPr lang="en-US" dirty="0" smtClean="0"/>
-              <a:t>Azure Storage </a:t>
+              <a:t>Azure Storage and Cognitive Services HOL (MVC).html</a:t>
+            </a:r>
+          </a:p>
+          <a:p>
+            <a:r>
+              <a:rPr lang="en-US" dirty="0"/>
+              <a:t>Azure Storage and Cognitive Services </a:t>
             </a:r>
             <a:r>
               <a:rPr lang="en-US" dirty="0" smtClean="0"/>
-              <a:t>and Cognitive Services HOL </a:t>
-            </a:r>
-            <a:r>
-              <a:rPr lang="en-US" dirty="0" smtClean="0"/>
-              <a:t>(MVC).html</a:t>
-            </a:r>
-          </a:p>
-          <a:p>
-            <a:r>
-              <a:rPr lang="en-US" dirty="0"/>
-              <a:t>Azure </a:t>
-            </a:r>
-            <a:r>
-              <a:rPr lang="en-US" dirty="0"/>
-              <a:t>Storage and Cognitive Services </a:t>
-            </a:r>
-            <a:r>
-              <a:rPr lang="en-US" dirty="0" smtClean="0"/>
-              <a:t>HOL </a:t>
-            </a:r>
-            <a:r>
-              <a:rPr lang="en-US" dirty="0" smtClean="0"/>
-              <a:t>(Node).html</a:t>
+              <a:t>HOL (Node).html</a:t>
             </a:r>
             <a:endParaRPr lang="en-US" dirty="0"/>
           </a:p>
@@ -25184,7 +26238,7 @@
             <a:r>
               <a:rPr lang="en-US" sz="3200" dirty="0" err="1">
                 <a:solidFill>
-                  <a:schemeClr val="accent1"/>
+                  <a:srgbClr val="7F7F7F"/>
                 </a:solidFill>
               </a:rPr>
               <a:t>st</a:t>
@@ -25192,7 +26246,7 @@
             <a:r>
               <a:rPr lang="en-US" sz="3200" dirty="0">
                 <a:solidFill>
-                  <a:schemeClr val="accent1"/>
+                  <a:srgbClr val="7F7F7F"/>
                 </a:solidFill>
               </a:rPr>
               <a:t>=2016-02-07T19%3A58%3A00Z&amp;se=2016-02-08T19%3A58%3A00Z&amp;sp=</a:t>
@@ -25200,7 +26254,7 @@
             <a:r>
               <a:rPr lang="en-US" sz="3200" dirty="0" err="1">
                 <a:solidFill>
-                  <a:schemeClr val="accent1"/>
+                  <a:srgbClr val="7F7F7F"/>
                 </a:solidFill>
               </a:rPr>
               <a:t>r&amp;sv</a:t>
@@ -25208,7 +26262,7 @@
             <a:r>
               <a:rPr lang="en-US" sz="3200" dirty="0">
                 <a:solidFill>
-                  <a:schemeClr val="accent1"/>
+                  <a:srgbClr val="7F7F7F"/>
                 </a:solidFill>
               </a:rPr>
               <a:t>=2015-02-21&amp;sr=</a:t>
@@ -25216,7 +26270,7 @@
             <a:r>
               <a:rPr lang="en-US" sz="3200" dirty="0" err="1">
                 <a:solidFill>
-                  <a:schemeClr val="accent1"/>
+                  <a:srgbClr val="7F7F7F"/>
                 </a:solidFill>
               </a:rPr>
               <a:t>b&amp;sig</a:t>
@@ -25224,7 +26278,7 @@
             <a:r>
               <a:rPr lang="en-US" sz="3200" dirty="0">
                 <a:solidFill>
-                  <a:schemeClr val="accent1"/>
+                  <a:srgbClr val="7F7F7F"/>
                 </a:solidFill>
               </a:rPr>
               <a:t>=BGebg1eduvPTwQnZWZlBphM8YGP9sRYt2WiPIL70vcw%3D</a:t>
@@ -25313,7 +26367,7 @@
             <a:r>
               <a:rPr lang="en-US" sz="3200" dirty="0" smtClean="0">
                 <a:solidFill>
-                  <a:schemeClr val="accent1"/>
+                  <a:srgbClr val="7F7F7F"/>
                 </a:solidFill>
               </a:rPr>
               <a:t>Query string containing</a:t>
@@ -25332,14 +26386,14 @@
             <a:r>
               <a:rPr lang="en-US" sz="3200" dirty="0" smtClean="0">
                 <a:solidFill>
-                  <a:schemeClr val="accent1"/>
+                  <a:srgbClr val="7F7F7F"/>
                 </a:solidFill>
               </a:rPr>
               <a:t>shared-access signature</a:t>
             </a:r>
             <a:endParaRPr lang="en-US" sz="3200" dirty="0">
               <a:solidFill>
-                <a:schemeClr val="accent1"/>
+                <a:srgbClr val="7F7F7F"/>
               </a:solidFill>
             </a:endParaRPr>
           </a:p>
@@ -25398,7 +26452,7 @@
           </a:prstGeom>
           <a:ln w="28575">
             <a:solidFill>
-              <a:schemeClr val="accent1"/>
+              <a:srgbClr val="7F7F7F"/>
             </a:solidFill>
           </a:ln>
         </p:spPr>
@@ -25542,7 +26596,7 @@
           <p:nvPr/>
         </p:nvPicPr>
         <p:blipFill>
-          <a:blip r:embed="rId2"/>
+          <a:blip r:embed="rId3"/>
           <a:stretch>
             <a:fillRect/>
           </a:stretch>

</xml_diff>